<commit_message>
Deck updates with pictures to separate demos
</commit_message>
<xml_diff>
--- a/TestingT-SQLMadeEasy.pptx
+++ b/TestingT-SQLMadeEasy.pptx
@@ -5,7 +5,7 @@
     <p:sldMasterId id="2147483648" r:id="rId1"/>
   </p:sldMasterIdLst>
   <p:notesMasterIdLst>
-    <p:notesMasterId r:id="rId17"/>
+    <p:notesMasterId r:id="rId22"/>
   </p:notesMasterIdLst>
   <p:sldIdLst>
     <p:sldId id="256" r:id="rId2"/>
@@ -15,14 +15,19 @@
     <p:sldId id="265" r:id="rId6"/>
     <p:sldId id="264" r:id="rId7"/>
     <p:sldId id="266" r:id="rId8"/>
-    <p:sldId id="267" r:id="rId9"/>
-    <p:sldId id="268" r:id="rId10"/>
-    <p:sldId id="269" r:id="rId11"/>
-    <p:sldId id="271" r:id="rId12"/>
-    <p:sldId id="270" r:id="rId13"/>
-    <p:sldId id="262" r:id="rId14"/>
-    <p:sldId id="263" r:id="rId15"/>
-    <p:sldId id="257" r:id="rId16"/>
+    <p:sldId id="272" r:id="rId9"/>
+    <p:sldId id="267" r:id="rId10"/>
+    <p:sldId id="273" r:id="rId11"/>
+    <p:sldId id="268" r:id="rId12"/>
+    <p:sldId id="274" r:id="rId13"/>
+    <p:sldId id="269" r:id="rId14"/>
+    <p:sldId id="275" r:id="rId15"/>
+    <p:sldId id="271" r:id="rId16"/>
+    <p:sldId id="276" r:id="rId17"/>
+    <p:sldId id="270" r:id="rId18"/>
+    <p:sldId id="262" r:id="rId19"/>
+    <p:sldId id="263" r:id="rId20"/>
+    <p:sldId id="257" r:id="rId21"/>
   </p:sldIdLst>
   <p:sldSz cx="9144000" cy="6858000" type="screen4x3"/>
   <p:notesSz cx="6858000" cy="9144000"/>
@@ -222,7 +227,7 @@
           <a:p>
             <a:fld id="{45C7EBF0-803C-4B76-9D07-56FBE9171A73}" type="datetimeFigureOut">
               <a:rPr lang="en-US" smtClean="0"/>
-              <a:t>4/24/2016</a:t>
+              <a:t>4/28/2016</a:t>
             </a:fld>
             <a:endParaRPr lang="en-US"/>
           </a:p>
@@ -758,6 +763,94 @@
 </p:notes>
 </file>
 
+<file path=ppt/notesSlides/notesSlide2.xml><?xml version="1.0" encoding="utf-8"?>
+<p:notes xmlns:a="http://schemas.openxmlformats.org/drawingml/2006/main" xmlns:r="http://schemas.openxmlformats.org/officeDocument/2006/relationships" xmlns:p="http://schemas.openxmlformats.org/presentationml/2006/main">
+  <p:cSld>
+    <p:spTree>
+      <p:nvGrpSpPr>
+        <p:cNvPr id="1" name=""/>
+        <p:cNvGrpSpPr/>
+        <p:nvPr/>
+      </p:nvGrpSpPr>
+      <p:grpSpPr>
+        <a:xfrm>
+          <a:off x="0" y="0"/>
+          <a:ext cx="0" cy="0"/>
+          <a:chOff x="0" y="0"/>
+          <a:chExt cx="0" cy="0"/>
+        </a:xfrm>
+      </p:grpSpPr>
+      <p:sp>
+        <p:nvSpPr>
+          <p:cNvPr id="2" name="Slide Image Placeholder 1"/>
+          <p:cNvSpPr>
+            <a:spLocks noGrp="1" noRot="1" noChangeAspect="1"/>
+          </p:cNvSpPr>
+          <p:nvPr>
+            <p:ph type="sldImg"/>
+          </p:nvPr>
+        </p:nvSpPr>
+        <p:spPr/>
+      </p:sp>
+      <p:sp>
+        <p:nvSpPr>
+          <p:cNvPr id="3" name="Notes Placeholder 2"/>
+          <p:cNvSpPr>
+            <a:spLocks noGrp="1"/>
+          </p:cNvSpPr>
+          <p:nvPr>
+            <p:ph type="body" idx="1"/>
+          </p:nvPr>
+        </p:nvSpPr>
+        <p:spPr/>
+        <p:txBody>
+          <a:bodyPr/>
+          <a:lstStyle/>
+          <a:p>
+            <a:r>
+              <a:rPr lang="en-US" dirty="0" smtClean="0"/>
+              <a:t>https://s-media-cache-ak0.pinimg.com/736x/2e/93/1e/2e931ec9f055c57863c89c7d221dd8ad.jpg</a:t>
+            </a:r>
+            <a:endParaRPr lang="en-US" dirty="0"/>
+          </a:p>
+        </p:txBody>
+      </p:sp>
+      <p:sp>
+        <p:nvSpPr>
+          <p:cNvPr id="4" name="Slide Number Placeholder 3"/>
+          <p:cNvSpPr>
+            <a:spLocks noGrp="1"/>
+          </p:cNvSpPr>
+          <p:nvPr>
+            <p:ph type="sldNum" sz="quarter" idx="10"/>
+          </p:nvPr>
+        </p:nvSpPr>
+        <p:spPr/>
+        <p:txBody>
+          <a:bodyPr/>
+          <a:lstStyle/>
+          <a:p>
+            <a:fld id="{7A5225B9-E196-4FDE-87C0-109C6BD01523}" type="slidenum">
+              <a:rPr lang="en-US" smtClean="0"/>
+              <a:t>12</a:t>
+            </a:fld>
+            <a:endParaRPr lang="en-US"/>
+          </a:p>
+        </p:txBody>
+      </p:sp>
+    </p:spTree>
+    <p:extLst>
+      <p:ext uri="{BB962C8B-B14F-4D97-AF65-F5344CB8AC3E}">
+        <p14:creationId xmlns:p14="http://schemas.microsoft.com/office/powerpoint/2010/main" val="194029522"/>
+      </p:ext>
+    </p:extLst>
+  </p:cSld>
+  <p:clrMapOvr>
+    <a:masterClrMapping/>
+  </p:clrMapOvr>
+</p:notes>
+</file>
+
 <file path=ppt/slideLayouts/slideLayout1.xml><?xml version="1.0" encoding="utf-8"?>
 <p:sldLayout xmlns:a="http://schemas.openxmlformats.org/drawingml/2006/main" xmlns:r="http://schemas.openxmlformats.org/officeDocument/2006/relationships" xmlns:p="http://schemas.openxmlformats.org/presentationml/2006/main" type="title" preserve="1">
   <p:cSld name="Title Slide">
@@ -938,7 +1031,7 @@
             <a:fld id="{1D8BD707-D9CF-40AE-B4C6-C98DA3205C09}" type="datetimeFigureOut">
               <a:rPr lang="en-US" smtClean="0"/>
               <a:pPr/>
-              <a:t>4/24/2016</a:t>
+              <a:t>4/28/2016</a:t>
             </a:fld>
             <a:endParaRPr lang="en-US"/>
           </a:p>
@@ -1103,7 +1196,7 @@
             <a:fld id="{1D8BD707-D9CF-40AE-B4C6-C98DA3205C09}" type="datetimeFigureOut">
               <a:rPr lang="en-US" smtClean="0"/>
               <a:pPr/>
-              <a:t>4/24/2016</a:t>
+              <a:t>4/28/2016</a:t>
             </a:fld>
             <a:endParaRPr lang="en-US"/>
           </a:p>
@@ -1278,7 +1371,7 @@
             <a:fld id="{1D8BD707-D9CF-40AE-B4C6-C98DA3205C09}" type="datetimeFigureOut">
               <a:rPr lang="en-US" smtClean="0"/>
               <a:pPr/>
-              <a:t>4/24/2016</a:t>
+              <a:t>4/28/2016</a:t>
             </a:fld>
             <a:endParaRPr lang="en-US"/>
           </a:p>
@@ -1443,7 +1536,7 @@
             <a:fld id="{1D8BD707-D9CF-40AE-B4C6-C98DA3205C09}" type="datetimeFigureOut">
               <a:rPr lang="en-US" smtClean="0"/>
               <a:pPr/>
-              <a:t>4/24/2016</a:t>
+              <a:t>4/28/2016</a:t>
             </a:fld>
             <a:endParaRPr lang="en-US"/>
           </a:p>
@@ -1685,7 +1778,7 @@
             <a:fld id="{1D8BD707-D9CF-40AE-B4C6-C98DA3205C09}" type="datetimeFigureOut">
               <a:rPr lang="en-US" smtClean="0"/>
               <a:pPr/>
-              <a:t>4/24/2016</a:t>
+              <a:t>4/28/2016</a:t>
             </a:fld>
             <a:endParaRPr lang="en-US"/>
           </a:p>
@@ -1967,7 +2060,7 @@
             <a:fld id="{1D8BD707-D9CF-40AE-B4C6-C98DA3205C09}" type="datetimeFigureOut">
               <a:rPr lang="en-US" smtClean="0"/>
               <a:pPr/>
-              <a:t>4/24/2016</a:t>
+              <a:t>4/28/2016</a:t>
             </a:fld>
             <a:endParaRPr lang="en-US"/>
           </a:p>
@@ -2383,7 +2476,7 @@
             <a:fld id="{1D8BD707-D9CF-40AE-B4C6-C98DA3205C09}" type="datetimeFigureOut">
               <a:rPr lang="en-US" smtClean="0"/>
               <a:pPr/>
-              <a:t>4/24/2016</a:t>
+              <a:t>4/28/2016</a:t>
             </a:fld>
             <a:endParaRPr lang="en-US"/>
           </a:p>
@@ -2497,7 +2590,7 @@
             <a:fld id="{1D8BD707-D9CF-40AE-B4C6-C98DA3205C09}" type="datetimeFigureOut">
               <a:rPr lang="en-US" smtClean="0"/>
               <a:pPr/>
-              <a:t>4/24/2016</a:t>
+              <a:t>4/28/2016</a:t>
             </a:fld>
             <a:endParaRPr lang="en-US"/>
           </a:p>
@@ -2589,7 +2682,7 @@
             <a:fld id="{1D8BD707-D9CF-40AE-B4C6-C98DA3205C09}" type="datetimeFigureOut">
               <a:rPr lang="en-US" smtClean="0"/>
               <a:pPr/>
-              <a:t>4/24/2016</a:t>
+              <a:t>4/28/2016</a:t>
             </a:fld>
             <a:endParaRPr lang="en-US"/>
           </a:p>
@@ -2861,7 +2954,7 @@
             <a:fld id="{1D8BD707-D9CF-40AE-B4C6-C98DA3205C09}" type="datetimeFigureOut">
               <a:rPr lang="en-US" smtClean="0"/>
               <a:pPr/>
-              <a:t>4/24/2016</a:t>
+              <a:t>4/28/2016</a:t>
             </a:fld>
             <a:endParaRPr lang="en-US"/>
           </a:p>
@@ -3110,7 +3203,7 @@
             <a:fld id="{1D8BD707-D9CF-40AE-B4C6-C98DA3205C09}" type="datetimeFigureOut">
               <a:rPr lang="en-US" smtClean="0"/>
               <a:pPr/>
-              <a:t>4/24/2016</a:t>
+              <a:t>4/28/2016</a:t>
             </a:fld>
             <a:endParaRPr lang="en-US"/>
           </a:p>
@@ -3318,7 +3411,7 @@
             <a:fld id="{1D8BD707-D9CF-40AE-B4C6-C98DA3205C09}" type="datetimeFigureOut">
               <a:rPr lang="en-US" smtClean="0"/>
               <a:pPr/>
-              <a:t>4/24/2016</a:t>
+              <a:t>4/28/2016</a:t>
             </a:fld>
             <a:endParaRPr lang="en-US"/>
           </a:p>
@@ -3835,54 +3928,40 @@
           <a:chExt cx="0" cy="0"/>
         </a:xfrm>
       </p:grpSpPr>
-      <p:sp>
-        <p:nvSpPr>
-          <p:cNvPr id="4" name="Title 3"/>
-          <p:cNvSpPr>
-            <a:spLocks noGrp="1"/>
-          </p:cNvSpPr>
-          <p:nvPr>
-            <p:ph type="title"/>
-          </p:nvPr>
-        </p:nvSpPr>
-        <p:spPr/>
-        <p:txBody>
-          <a:bodyPr/>
-          <a:lstStyle/>
-          <a:p>
-            <a:r>
-              <a:rPr lang="en-US" dirty="0"/>
-              <a:t>Demo</a:t>
-            </a:r>
-          </a:p>
-        </p:txBody>
-      </p:sp>
-      <p:sp>
-        <p:nvSpPr>
-          <p:cNvPr id="5" name="Text Placeholder 4"/>
-          <p:cNvSpPr>
-            <a:spLocks noGrp="1"/>
-          </p:cNvSpPr>
-          <p:nvPr>
-            <p:ph type="body" idx="1"/>
-          </p:nvPr>
-        </p:nvSpPr>
-        <p:spPr/>
-        <p:txBody>
-          <a:bodyPr/>
-          <a:lstStyle/>
-          <a:p>
-            <a:r>
-              <a:rPr lang="en-US" dirty="0"/>
-              <a:t>GETDATE()</a:t>
-            </a:r>
-          </a:p>
-        </p:txBody>
-      </p:sp>
+      <p:pic>
+        <p:nvPicPr>
+          <p:cNvPr id="4" name="Picture 3"/>
+          <p:cNvPicPr>
+            <a:picLocks noChangeAspect="1"/>
+          </p:cNvPicPr>
+          <p:nvPr/>
+        </p:nvPicPr>
+        <p:blipFill>
+          <a:blip r:embed="rId2">
+            <a:extLst>
+              <a:ext uri="{28A0092B-C50C-407E-A947-70E740481C1C}">
+                <a14:useLocalDpi xmlns:a14="http://schemas.microsoft.com/office/drawing/2010/main" val="0"/>
+              </a:ext>
+            </a:extLst>
+          </a:blip>
+          <a:stretch>
+            <a:fillRect/>
+          </a:stretch>
+        </p:blipFill>
+        <p:spPr>
+          <a:xfrm>
+            <a:off x="1752600" y="1447800"/>
+            <a:ext cx="5448300" cy="3962400"/>
+          </a:xfrm>
+          <a:prstGeom prst="rect">
+            <a:avLst/>
+          </a:prstGeom>
+        </p:spPr>
+      </p:pic>
     </p:spTree>
     <p:extLst>
       <p:ext uri="{BB962C8B-B14F-4D97-AF65-F5344CB8AC3E}">
-        <p14:creationId xmlns:p14="http://schemas.microsoft.com/office/powerpoint/2010/main" val="1448552941"/>
+        <p14:creationId xmlns:p14="http://schemas.microsoft.com/office/powerpoint/2010/main" val="2124828705"/>
       </p:ext>
     </p:extLst>
   </p:cSld>
@@ -3948,7 +4027,7 @@
           <a:p>
             <a:r>
               <a:rPr lang="en-US" dirty="0"/>
-              <a:t>Isolating Functions and Procedures</a:t>
+              <a:t>Checking Joins</a:t>
             </a:r>
           </a:p>
         </p:txBody>
@@ -3956,7 +4035,7 @@
     </p:spTree>
     <p:extLst>
       <p:ext uri="{BB962C8B-B14F-4D97-AF65-F5344CB8AC3E}">
-        <p14:creationId xmlns:p14="http://schemas.microsoft.com/office/powerpoint/2010/main" val="259900488"/>
+        <p14:creationId xmlns:p14="http://schemas.microsoft.com/office/powerpoint/2010/main" val="1112910982"/>
       </p:ext>
     </p:extLst>
   </p:cSld>
@@ -3983,54 +4062,40 @@
           <a:chExt cx="0" cy="0"/>
         </a:xfrm>
       </p:grpSpPr>
-      <p:sp>
-        <p:nvSpPr>
-          <p:cNvPr id="4" name="Title 3"/>
-          <p:cNvSpPr>
-            <a:spLocks noGrp="1"/>
-          </p:cNvSpPr>
-          <p:nvPr>
-            <p:ph type="title"/>
-          </p:nvPr>
-        </p:nvSpPr>
-        <p:spPr/>
-        <p:txBody>
-          <a:bodyPr/>
-          <a:lstStyle/>
-          <a:p>
-            <a:r>
-              <a:rPr lang="en-US" dirty="0"/>
-              <a:t>Demo</a:t>
-            </a:r>
-          </a:p>
-        </p:txBody>
-      </p:sp>
-      <p:sp>
-        <p:nvSpPr>
-          <p:cNvPr id="5" name="Text Placeholder 4"/>
-          <p:cNvSpPr>
-            <a:spLocks noGrp="1"/>
-          </p:cNvSpPr>
-          <p:nvPr>
-            <p:ph type="body" idx="1"/>
-          </p:nvPr>
-        </p:nvSpPr>
-        <p:spPr/>
-        <p:txBody>
-          <a:bodyPr/>
-          <a:lstStyle/>
-          <a:p>
-            <a:r>
-              <a:rPr lang="en-US" dirty="0"/>
-              <a:t>Heuristics</a:t>
-            </a:r>
-          </a:p>
-        </p:txBody>
-      </p:sp>
+      <p:pic>
+        <p:nvPicPr>
+          <p:cNvPr id="4" name="Picture 3"/>
+          <p:cNvPicPr>
+            <a:picLocks noChangeAspect="1"/>
+          </p:cNvPicPr>
+          <p:nvPr/>
+        </p:nvPicPr>
+        <p:blipFill>
+          <a:blip r:embed="rId3">
+            <a:extLst>
+              <a:ext uri="{28A0092B-C50C-407E-A947-70E740481C1C}">
+                <a14:useLocalDpi xmlns:a14="http://schemas.microsoft.com/office/drawing/2010/main" val="0"/>
+              </a:ext>
+            </a:extLst>
+          </a:blip>
+          <a:stretch>
+            <a:fillRect/>
+          </a:stretch>
+        </p:blipFill>
+        <p:spPr>
+          <a:xfrm>
+            <a:off x="1905000" y="1447800"/>
+            <a:ext cx="5403809" cy="3657600"/>
+          </a:xfrm>
+          <a:prstGeom prst="rect">
+            <a:avLst/>
+          </a:prstGeom>
+        </p:spPr>
+      </p:pic>
     </p:spTree>
     <p:extLst>
       <p:ext uri="{BB962C8B-B14F-4D97-AF65-F5344CB8AC3E}">
-        <p14:creationId xmlns:p14="http://schemas.microsoft.com/office/powerpoint/2010/main" val="3312720225"/>
+        <p14:creationId xmlns:p14="http://schemas.microsoft.com/office/powerpoint/2010/main" val="2896046553"/>
       </p:ext>
     </p:extLst>
   </p:cSld>
@@ -4074,6 +4139,402 @@
           <a:p>
             <a:r>
               <a:rPr lang="en-US" dirty="0"/>
+              <a:t>Demo</a:t>
+            </a:r>
+          </a:p>
+        </p:txBody>
+      </p:sp>
+      <p:sp>
+        <p:nvSpPr>
+          <p:cNvPr id="5" name="Text Placeholder 4"/>
+          <p:cNvSpPr>
+            <a:spLocks noGrp="1"/>
+          </p:cNvSpPr>
+          <p:nvPr>
+            <p:ph type="body" idx="1"/>
+          </p:nvPr>
+        </p:nvSpPr>
+        <p:spPr/>
+        <p:txBody>
+          <a:bodyPr/>
+          <a:lstStyle/>
+          <a:p>
+            <a:r>
+              <a:rPr lang="en-US" dirty="0"/>
+              <a:t>GETDATE()</a:t>
+            </a:r>
+          </a:p>
+        </p:txBody>
+      </p:sp>
+    </p:spTree>
+    <p:extLst>
+      <p:ext uri="{BB962C8B-B14F-4D97-AF65-F5344CB8AC3E}">
+        <p14:creationId xmlns:p14="http://schemas.microsoft.com/office/powerpoint/2010/main" val="1448552941"/>
+      </p:ext>
+    </p:extLst>
+  </p:cSld>
+  <p:clrMapOvr>
+    <a:masterClrMapping/>
+  </p:clrMapOvr>
+</p:sld>
+</file>
+
+<file path=ppt/slides/slide14.xml><?xml version="1.0" encoding="utf-8"?>
+<p:sld xmlns:a="http://schemas.openxmlformats.org/drawingml/2006/main" xmlns:r="http://schemas.openxmlformats.org/officeDocument/2006/relationships" xmlns:p="http://schemas.openxmlformats.org/presentationml/2006/main">
+  <p:cSld>
+    <p:spTree>
+      <p:nvGrpSpPr>
+        <p:cNvPr id="1" name=""/>
+        <p:cNvGrpSpPr/>
+        <p:nvPr/>
+      </p:nvGrpSpPr>
+      <p:grpSpPr>
+        <a:xfrm>
+          <a:off x="0" y="0"/>
+          <a:ext cx="0" cy="0"/>
+          <a:chOff x="0" y="0"/>
+          <a:chExt cx="0" cy="0"/>
+        </a:xfrm>
+      </p:grpSpPr>
+      <p:sp>
+        <p:nvSpPr>
+          <p:cNvPr id="4" name="Title 3"/>
+          <p:cNvSpPr>
+            <a:spLocks noGrp="1"/>
+          </p:cNvSpPr>
+          <p:nvPr>
+            <p:ph type="title"/>
+          </p:nvPr>
+        </p:nvSpPr>
+        <p:spPr/>
+        <p:txBody>
+          <a:bodyPr/>
+          <a:lstStyle/>
+          <a:p>
+            <a:r>
+              <a:rPr lang="en-US" dirty="0" smtClean="0"/>
+              <a:t>Isolating Code</a:t>
+            </a:r>
+            <a:endParaRPr lang="en-US" dirty="0"/>
+          </a:p>
+        </p:txBody>
+      </p:sp>
+      <p:sp>
+        <p:nvSpPr>
+          <p:cNvPr id="5" name="Content Placeholder 4"/>
+          <p:cNvSpPr>
+            <a:spLocks noGrp="1"/>
+          </p:cNvSpPr>
+          <p:nvPr>
+            <p:ph idx="1"/>
+          </p:nvPr>
+        </p:nvSpPr>
+        <p:spPr/>
+        <p:txBody>
+          <a:bodyPr/>
+          <a:lstStyle/>
+          <a:p>
+            <a:r>
+              <a:rPr lang="en-US" dirty="0" smtClean="0"/>
+              <a:t>We don’t want our tests to depend on more than one module of code.</a:t>
+            </a:r>
+          </a:p>
+          <a:p>
+            <a:r>
+              <a:rPr lang="en-US" dirty="0" smtClean="0"/>
+              <a:t>Dependencies can cause complexities in debugging and </a:t>
+            </a:r>
+            <a:r>
+              <a:rPr lang="en-US" smtClean="0"/>
+              <a:t>testing.</a:t>
+            </a:r>
+            <a:endParaRPr lang="en-US"/>
+          </a:p>
+        </p:txBody>
+      </p:sp>
+    </p:spTree>
+    <p:extLst>
+      <p:ext uri="{BB962C8B-B14F-4D97-AF65-F5344CB8AC3E}">
+        <p14:creationId xmlns:p14="http://schemas.microsoft.com/office/powerpoint/2010/main" val="4211305238"/>
+      </p:ext>
+    </p:extLst>
+  </p:cSld>
+  <p:clrMapOvr>
+    <a:masterClrMapping/>
+  </p:clrMapOvr>
+</p:sld>
+</file>
+
+<file path=ppt/slides/slide15.xml><?xml version="1.0" encoding="utf-8"?>
+<p:sld xmlns:a="http://schemas.openxmlformats.org/drawingml/2006/main" xmlns:r="http://schemas.openxmlformats.org/officeDocument/2006/relationships" xmlns:p="http://schemas.openxmlformats.org/presentationml/2006/main">
+  <p:cSld>
+    <p:spTree>
+      <p:nvGrpSpPr>
+        <p:cNvPr id="1" name=""/>
+        <p:cNvGrpSpPr/>
+        <p:nvPr/>
+      </p:nvGrpSpPr>
+      <p:grpSpPr>
+        <a:xfrm>
+          <a:off x="0" y="0"/>
+          <a:ext cx="0" cy="0"/>
+          <a:chOff x="0" y="0"/>
+          <a:chExt cx="0" cy="0"/>
+        </a:xfrm>
+      </p:grpSpPr>
+      <p:sp>
+        <p:nvSpPr>
+          <p:cNvPr id="4" name="Title 3"/>
+          <p:cNvSpPr>
+            <a:spLocks noGrp="1"/>
+          </p:cNvSpPr>
+          <p:nvPr>
+            <p:ph type="title"/>
+          </p:nvPr>
+        </p:nvSpPr>
+        <p:spPr/>
+        <p:txBody>
+          <a:bodyPr/>
+          <a:lstStyle/>
+          <a:p>
+            <a:r>
+              <a:rPr lang="en-US" dirty="0"/>
+              <a:t>Demo</a:t>
+            </a:r>
+          </a:p>
+        </p:txBody>
+      </p:sp>
+      <p:sp>
+        <p:nvSpPr>
+          <p:cNvPr id="5" name="Text Placeholder 4"/>
+          <p:cNvSpPr>
+            <a:spLocks noGrp="1"/>
+          </p:cNvSpPr>
+          <p:nvPr>
+            <p:ph type="body" idx="1"/>
+          </p:nvPr>
+        </p:nvSpPr>
+        <p:spPr/>
+        <p:txBody>
+          <a:bodyPr/>
+          <a:lstStyle/>
+          <a:p>
+            <a:r>
+              <a:rPr lang="en-US" dirty="0"/>
+              <a:t>Isolating Functions and Procedures</a:t>
+            </a:r>
+          </a:p>
+        </p:txBody>
+      </p:sp>
+    </p:spTree>
+    <p:extLst>
+      <p:ext uri="{BB962C8B-B14F-4D97-AF65-F5344CB8AC3E}">
+        <p14:creationId xmlns:p14="http://schemas.microsoft.com/office/powerpoint/2010/main" val="259900488"/>
+      </p:ext>
+    </p:extLst>
+  </p:cSld>
+  <p:clrMapOvr>
+    <a:masterClrMapping/>
+  </p:clrMapOvr>
+</p:sld>
+</file>
+
+<file path=ppt/slides/slide16.xml><?xml version="1.0" encoding="utf-8"?>
+<p:sld xmlns:a="http://schemas.openxmlformats.org/drawingml/2006/main" xmlns:r="http://schemas.openxmlformats.org/officeDocument/2006/relationships" xmlns:p="http://schemas.openxmlformats.org/presentationml/2006/main">
+  <p:cSld>
+    <p:spTree>
+      <p:nvGrpSpPr>
+        <p:cNvPr id="1" name=""/>
+        <p:cNvGrpSpPr/>
+        <p:nvPr/>
+      </p:nvGrpSpPr>
+      <p:grpSpPr>
+        <a:xfrm>
+          <a:off x="0" y="0"/>
+          <a:ext cx="0" cy="0"/>
+          <a:chOff x="0" y="0"/>
+          <a:chExt cx="0" cy="0"/>
+        </a:xfrm>
+      </p:grpSpPr>
+      <p:sp>
+        <p:nvSpPr>
+          <p:cNvPr id="4" name="Title 3"/>
+          <p:cNvSpPr>
+            <a:spLocks noGrp="1"/>
+          </p:cNvSpPr>
+          <p:nvPr>
+            <p:ph type="title"/>
+          </p:nvPr>
+        </p:nvSpPr>
+        <p:spPr/>
+        <p:txBody>
+          <a:bodyPr/>
+          <a:lstStyle/>
+          <a:p>
+            <a:r>
+              <a:rPr lang="en-US" dirty="0" smtClean="0"/>
+              <a:t>Heuristics</a:t>
+            </a:r>
+            <a:endParaRPr lang="en-US" dirty="0"/>
+          </a:p>
+        </p:txBody>
+      </p:sp>
+      <p:sp>
+        <p:nvSpPr>
+          <p:cNvPr id="5" name="Content Placeholder 4"/>
+          <p:cNvSpPr>
+            <a:spLocks noGrp="1"/>
+          </p:cNvSpPr>
+          <p:nvPr>
+            <p:ph idx="1"/>
+          </p:nvPr>
+        </p:nvSpPr>
+        <p:spPr/>
+        <p:txBody>
+          <a:bodyPr/>
+          <a:lstStyle/>
+          <a:p>
+            <a:r>
+              <a:rPr lang="en-US" dirty="0" smtClean="0"/>
+              <a:t>Boundaries</a:t>
+            </a:r>
+          </a:p>
+          <a:p>
+            <a:r>
+              <a:rPr lang="en-US" dirty="0" smtClean="0"/>
+              <a:t>Buckets</a:t>
+            </a:r>
+          </a:p>
+          <a:p>
+            <a:r>
+              <a:rPr lang="en-US" smtClean="0"/>
+              <a:t>Various cases</a:t>
+            </a:r>
+            <a:endParaRPr lang="en-US"/>
+          </a:p>
+        </p:txBody>
+      </p:sp>
+    </p:spTree>
+    <p:extLst>
+      <p:ext uri="{BB962C8B-B14F-4D97-AF65-F5344CB8AC3E}">
+        <p14:creationId xmlns:p14="http://schemas.microsoft.com/office/powerpoint/2010/main" val="510018384"/>
+      </p:ext>
+    </p:extLst>
+  </p:cSld>
+  <p:clrMapOvr>
+    <a:masterClrMapping/>
+  </p:clrMapOvr>
+</p:sld>
+</file>
+
+<file path=ppt/slides/slide17.xml><?xml version="1.0" encoding="utf-8"?>
+<p:sld xmlns:a="http://schemas.openxmlformats.org/drawingml/2006/main" xmlns:r="http://schemas.openxmlformats.org/officeDocument/2006/relationships" xmlns:p="http://schemas.openxmlformats.org/presentationml/2006/main">
+  <p:cSld>
+    <p:spTree>
+      <p:nvGrpSpPr>
+        <p:cNvPr id="1" name=""/>
+        <p:cNvGrpSpPr/>
+        <p:nvPr/>
+      </p:nvGrpSpPr>
+      <p:grpSpPr>
+        <a:xfrm>
+          <a:off x="0" y="0"/>
+          <a:ext cx="0" cy="0"/>
+          <a:chOff x="0" y="0"/>
+          <a:chExt cx="0" cy="0"/>
+        </a:xfrm>
+      </p:grpSpPr>
+      <p:sp>
+        <p:nvSpPr>
+          <p:cNvPr id="4" name="Title 3"/>
+          <p:cNvSpPr>
+            <a:spLocks noGrp="1"/>
+          </p:cNvSpPr>
+          <p:nvPr>
+            <p:ph type="title"/>
+          </p:nvPr>
+        </p:nvSpPr>
+        <p:spPr/>
+        <p:txBody>
+          <a:bodyPr/>
+          <a:lstStyle/>
+          <a:p>
+            <a:r>
+              <a:rPr lang="en-US" dirty="0"/>
+              <a:t>Demo</a:t>
+            </a:r>
+          </a:p>
+        </p:txBody>
+      </p:sp>
+      <p:sp>
+        <p:nvSpPr>
+          <p:cNvPr id="5" name="Text Placeholder 4"/>
+          <p:cNvSpPr>
+            <a:spLocks noGrp="1"/>
+          </p:cNvSpPr>
+          <p:nvPr>
+            <p:ph type="body" idx="1"/>
+          </p:nvPr>
+        </p:nvSpPr>
+        <p:spPr/>
+        <p:txBody>
+          <a:bodyPr/>
+          <a:lstStyle/>
+          <a:p>
+            <a:r>
+              <a:rPr lang="en-US" dirty="0"/>
+              <a:t>Heuristics</a:t>
+            </a:r>
+          </a:p>
+        </p:txBody>
+      </p:sp>
+    </p:spTree>
+    <p:extLst>
+      <p:ext uri="{BB962C8B-B14F-4D97-AF65-F5344CB8AC3E}">
+        <p14:creationId xmlns:p14="http://schemas.microsoft.com/office/powerpoint/2010/main" val="3312720225"/>
+      </p:ext>
+    </p:extLst>
+  </p:cSld>
+  <p:clrMapOvr>
+    <a:masterClrMapping/>
+  </p:clrMapOvr>
+</p:sld>
+</file>
+
+<file path=ppt/slides/slide18.xml><?xml version="1.0" encoding="utf-8"?>
+<p:sld xmlns:a="http://schemas.openxmlformats.org/drawingml/2006/main" xmlns:r="http://schemas.openxmlformats.org/officeDocument/2006/relationships" xmlns:p="http://schemas.openxmlformats.org/presentationml/2006/main">
+  <p:cSld>
+    <p:spTree>
+      <p:nvGrpSpPr>
+        <p:cNvPr id="1" name=""/>
+        <p:cNvGrpSpPr/>
+        <p:nvPr/>
+      </p:nvGrpSpPr>
+      <p:grpSpPr>
+        <a:xfrm>
+          <a:off x="0" y="0"/>
+          <a:ext cx="0" cy="0"/>
+          <a:chOff x="0" y="0"/>
+          <a:chExt cx="0" cy="0"/>
+        </a:xfrm>
+      </p:grpSpPr>
+      <p:sp>
+        <p:nvSpPr>
+          <p:cNvPr id="4" name="Title 3"/>
+          <p:cNvSpPr>
+            <a:spLocks noGrp="1"/>
+          </p:cNvSpPr>
+          <p:nvPr>
+            <p:ph type="title"/>
+          </p:nvPr>
+        </p:nvSpPr>
+        <p:spPr/>
+        <p:txBody>
+          <a:bodyPr/>
+          <a:lstStyle/>
+          <a:p>
+            <a:r>
+              <a:rPr lang="en-US" dirty="0"/>
               <a:t>Summary</a:t>
             </a:r>
           </a:p>
@@ -4111,7 +4572,7 @@
 </p:sld>
 </file>
 
-<file path=ppt/slides/slide14.xml><?xml version="1.0" encoding="utf-8"?>
+<file path=ppt/slides/slide19.xml><?xml version="1.0" encoding="utf-8"?>
 <p:sld xmlns:a="http://schemas.openxmlformats.org/drawingml/2006/main" xmlns:r="http://schemas.openxmlformats.org/officeDocument/2006/relationships" xmlns:p="http://schemas.openxmlformats.org/presentationml/2006/main">
   <p:cSld>
     <p:spTree>
@@ -4675,77 +5136,6 @@
 </p:sld>
 </file>
 
-<file path=ppt/slides/slide15.xml><?xml version="1.0" encoding="utf-8"?>
-<p:sld xmlns:a="http://schemas.openxmlformats.org/drawingml/2006/main" xmlns:r="http://schemas.openxmlformats.org/officeDocument/2006/relationships" xmlns:p="http://schemas.openxmlformats.org/presentationml/2006/main">
-  <p:cSld>
-    <p:spTree>
-      <p:nvGrpSpPr>
-        <p:cNvPr id="1" name=""/>
-        <p:cNvGrpSpPr/>
-        <p:nvPr/>
-      </p:nvGrpSpPr>
-      <p:grpSpPr>
-        <a:xfrm>
-          <a:off x="0" y="0"/>
-          <a:ext cx="0" cy="0"/>
-          <a:chOff x="0" y="0"/>
-          <a:chExt cx="0" cy="0"/>
-        </a:xfrm>
-      </p:grpSpPr>
-      <p:sp>
-        <p:nvSpPr>
-          <p:cNvPr id="2" name="Title 1"/>
-          <p:cNvSpPr>
-            <a:spLocks noGrp="1"/>
-          </p:cNvSpPr>
-          <p:nvPr>
-            <p:ph type="title"/>
-          </p:nvPr>
-        </p:nvSpPr>
-        <p:spPr/>
-        <p:txBody>
-          <a:bodyPr/>
-          <a:lstStyle/>
-          <a:p>
-            <a:r>
-              <a:rPr lang="en-US" dirty="0"/>
-              <a:t>References</a:t>
-            </a:r>
-          </a:p>
-        </p:txBody>
-      </p:sp>
-      <p:sp>
-        <p:nvSpPr>
-          <p:cNvPr id="3" name="Content Placeholder 2"/>
-          <p:cNvSpPr>
-            <a:spLocks noGrp="1"/>
-          </p:cNvSpPr>
-          <p:nvPr>
-            <p:ph idx="1"/>
-          </p:nvPr>
-        </p:nvSpPr>
-        <p:spPr/>
-        <p:txBody>
-          <a:bodyPr/>
-          <a:lstStyle/>
-          <a:p>
-            <a:endParaRPr lang="en-US"/>
-          </a:p>
-        </p:txBody>
-      </p:sp>
-    </p:spTree>
-    <p:extLst>
-      <p:ext uri="{BB962C8B-B14F-4D97-AF65-F5344CB8AC3E}">
-        <p14:creationId xmlns:p14="http://schemas.microsoft.com/office/powerpoint/2010/main" val="2092509307"/>
-      </p:ext>
-    </p:extLst>
-  </p:cSld>
-  <p:clrMapOvr>
-    <a:masterClrMapping/>
-  </p:clrMapOvr>
-</p:sld>
-</file>
-
 <file path=ppt/slides/slide2.xml><?xml version="1.0" encoding="utf-8"?>
 <p:sld xmlns:a="http://schemas.openxmlformats.org/drawingml/2006/main" xmlns:r="http://schemas.openxmlformats.org/officeDocument/2006/relationships" xmlns:p="http://schemas.openxmlformats.org/presentationml/2006/main">
   <p:cSld>
@@ -4859,6 +5249,77 @@
     <p:extLst>
       <p:ext uri="{BB962C8B-B14F-4D97-AF65-F5344CB8AC3E}">
         <p14:creationId xmlns:p14="http://schemas.microsoft.com/office/powerpoint/2010/main" val="2639831237"/>
+      </p:ext>
+    </p:extLst>
+  </p:cSld>
+  <p:clrMapOvr>
+    <a:masterClrMapping/>
+  </p:clrMapOvr>
+</p:sld>
+</file>
+
+<file path=ppt/slides/slide20.xml><?xml version="1.0" encoding="utf-8"?>
+<p:sld xmlns:a="http://schemas.openxmlformats.org/drawingml/2006/main" xmlns:r="http://schemas.openxmlformats.org/officeDocument/2006/relationships" xmlns:p="http://schemas.openxmlformats.org/presentationml/2006/main">
+  <p:cSld>
+    <p:spTree>
+      <p:nvGrpSpPr>
+        <p:cNvPr id="1" name=""/>
+        <p:cNvGrpSpPr/>
+        <p:nvPr/>
+      </p:nvGrpSpPr>
+      <p:grpSpPr>
+        <a:xfrm>
+          <a:off x="0" y="0"/>
+          <a:ext cx="0" cy="0"/>
+          <a:chOff x="0" y="0"/>
+          <a:chExt cx="0" cy="0"/>
+        </a:xfrm>
+      </p:grpSpPr>
+      <p:sp>
+        <p:nvSpPr>
+          <p:cNvPr id="2" name="Title 1"/>
+          <p:cNvSpPr>
+            <a:spLocks noGrp="1"/>
+          </p:cNvSpPr>
+          <p:nvPr>
+            <p:ph type="title"/>
+          </p:nvPr>
+        </p:nvSpPr>
+        <p:spPr/>
+        <p:txBody>
+          <a:bodyPr/>
+          <a:lstStyle/>
+          <a:p>
+            <a:r>
+              <a:rPr lang="en-US" dirty="0"/>
+              <a:t>References</a:t>
+            </a:r>
+          </a:p>
+        </p:txBody>
+      </p:sp>
+      <p:sp>
+        <p:nvSpPr>
+          <p:cNvPr id="3" name="Content Placeholder 2"/>
+          <p:cNvSpPr>
+            <a:spLocks noGrp="1"/>
+          </p:cNvSpPr>
+          <p:nvPr>
+            <p:ph idx="1"/>
+          </p:nvPr>
+        </p:nvSpPr>
+        <p:spPr/>
+        <p:txBody>
+          <a:bodyPr/>
+          <a:lstStyle/>
+          <a:p>
+            <a:endParaRPr lang="en-US"/>
+          </a:p>
+        </p:txBody>
+      </p:sp>
+    </p:spTree>
+    <p:extLst>
+      <p:ext uri="{BB962C8B-B14F-4D97-AF65-F5344CB8AC3E}">
+        <p14:creationId xmlns:p14="http://schemas.microsoft.com/office/powerpoint/2010/main" val="2092509307"/>
       </p:ext>
     </p:extLst>
   </p:cSld>
@@ -6181,38 +6642,52 @@
           <a:lstStyle/>
           <a:p>
             <a:r>
-              <a:rPr lang="en-US" dirty="0"/>
-              <a:t>Demo</a:t>
-            </a:r>
-          </a:p>
-        </p:txBody>
-      </p:sp>
-      <p:sp>
-        <p:nvSpPr>
-          <p:cNvPr id="5" name="Text Placeholder 4"/>
-          <p:cNvSpPr>
-            <a:spLocks noGrp="1"/>
-          </p:cNvSpPr>
-          <p:nvPr>
-            <p:ph type="body" idx="1"/>
-          </p:nvPr>
-        </p:nvSpPr>
-        <p:spPr/>
-        <p:txBody>
-          <a:bodyPr/>
-          <a:lstStyle/>
-          <a:p>
-            <a:r>
-              <a:rPr lang="en-US" dirty="0"/>
-              <a:t>Stopping ALTER TABLE</a:t>
-            </a:r>
+              <a:rPr lang="en-US" dirty="0" smtClean="0"/>
+              <a:t>Large Table Changes</a:t>
+            </a:r>
+            <a:endParaRPr lang="en-US" dirty="0"/>
+          </a:p>
+        </p:txBody>
+      </p:sp>
+      <p:sp>
+        <p:nvSpPr>
+          <p:cNvPr id="5" name="Content Placeholder 4"/>
+          <p:cNvSpPr>
+            <a:spLocks noGrp="1"/>
+          </p:cNvSpPr>
+          <p:nvPr>
+            <p:ph idx="1"/>
+          </p:nvPr>
+        </p:nvSpPr>
+        <p:spPr/>
+        <p:txBody>
+          <a:bodyPr/>
+          <a:lstStyle/>
+          <a:p>
+            <a:r>
+              <a:rPr lang="en-US" dirty="0" smtClean="0"/>
+              <a:t>There’s no magic in SQL Server</a:t>
+            </a:r>
+          </a:p>
+          <a:p>
+            <a:r>
+              <a:rPr lang="en-US" dirty="0" smtClean="0"/>
+              <a:t>However, there are methods to limit the impact of changes to large tables</a:t>
+            </a:r>
+          </a:p>
+          <a:p>
+            <a:r>
+              <a:rPr lang="en-US" dirty="0" smtClean="0"/>
+              <a:t>Testing is a way to facilitate a discussion</a:t>
+            </a:r>
+            <a:endParaRPr lang="en-US" dirty="0"/>
           </a:p>
         </p:txBody>
       </p:sp>
     </p:spTree>
     <p:extLst>
       <p:ext uri="{BB962C8B-B14F-4D97-AF65-F5344CB8AC3E}">
-        <p14:creationId xmlns:p14="http://schemas.microsoft.com/office/powerpoint/2010/main" val="1665435302"/>
+        <p14:creationId xmlns:p14="http://schemas.microsoft.com/office/powerpoint/2010/main" val="3738751375"/>
       </p:ext>
     </p:extLst>
   </p:cSld>
@@ -6278,7 +6753,7 @@
           <a:p>
             <a:r>
               <a:rPr lang="en-US" dirty="0"/>
-              <a:t>Checking Joins</a:t>
+              <a:t>Stopping ALTER TABLE</a:t>
             </a:r>
           </a:p>
         </p:txBody>
@@ -6286,7 +6761,7 @@
     </p:spTree>
     <p:extLst>
       <p:ext uri="{BB962C8B-B14F-4D97-AF65-F5344CB8AC3E}">
-        <p14:creationId xmlns:p14="http://schemas.microsoft.com/office/powerpoint/2010/main" val="1112910982"/>
+        <p14:creationId xmlns:p14="http://schemas.microsoft.com/office/powerpoint/2010/main" val="1665435302"/>
       </p:ext>
     </p:extLst>
   </p:cSld>

</xml_diff>